<commit_message>
29. updated notebook and ppt
</commit_message>
<xml_diff>
--- a/29/AQI.pptx
+++ b/29/AQI.pptx
@@ -284,7 +284,7 @@
       </p15:sldGuideLst>
     </p:ext>
     <p:ext uri="http://customooxmlschemas.google.com/">
-      <go:slidesCustomData xmlns:go="http://customooxmlschemas.google.com/" xmlns:p15="http://schemas.microsoft.com/office/powerpoint/2012/main" xmlns:p14="http://schemas.microsoft.com/office/powerpoint/2010/main" xmlns:com="http://schemas.openxmlformats.org/drawingml/2006/compatibility" xmlns:pvml="urn:schemas-microsoft-com:office:powerpoint" xmlns:v="urn:schemas-microsoft-com:vml" xmlns:o="urn:schemas-microsoft-com:office:office" xmlns:dgm="http://schemas.openxmlformats.org/drawingml/2006/diagram" xmlns:c="http://schemas.openxmlformats.org/drawingml/2006/chart" xmlns:mv="urn:schemas-microsoft-com:mac:vml" xmlns:mc="http://schemas.openxmlformats.org/markup-compatibility/2006" xmlns="" r:id="rId13" roundtripDataSignature="AMtx7mjdo7FECp685JsX7/4pIVeoAktjNA=="/>
+      <go:slidesCustomData xmlns="" xmlns:mc="http://schemas.openxmlformats.org/markup-compatibility/2006" xmlns:mv="urn:schemas-microsoft-com:mac:vml" xmlns:c="http://schemas.openxmlformats.org/drawingml/2006/chart" xmlns:dgm="http://schemas.openxmlformats.org/drawingml/2006/diagram" xmlns:o="urn:schemas-microsoft-com:office:office" xmlns:v="urn:schemas-microsoft-com:vml" xmlns:pvml="urn:schemas-microsoft-com:office:powerpoint" xmlns:com="http://schemas.openxmlformats.org/drawingml/2006/compatibility" xmlns:p14="http://schemas.microsoft.com/office/powerpoint/2010/main" xmlns:p15="http://schemas.microsoft.com/office/powerpoint/2012/main" xmlns:go="http://customooxmlschemas.google.com/" r:id="rId13" roundtripDataSignature="AMtx7mjdo7FECp685JsX7/4pIVeoAktjNA=="/>
     </p:ext>
   </p:extLst>
 </p:presentation>
@@ -293,7 +293,7 @@
 <file path=ppt/revisionInfo.xml><?xml version="1.0" encoding="utf-8"?>
 <p1510:revInfo xmlns:a="http://schemas.openxmlformats.org/drawingml/2006/main" xmlns:r="http://schemas.openxmlformats.org/officeDocument/2006/relationships" xmlns:p1510="http://schemas.microsoft.com/office/powerpoint/2015/10/main">
   <p1510:revLst>
-    <p1510:client id="{665B97CF-FAC7-4FE0-A793-E43D5A8FE138}" v="21" dt="2024-08-21T22:32:12.725"/>
+    <p1510:client id="{665B97CF-FAC7-4FE0-A793-E43D5A8FE138}" v="22" dt="2024-08-22T04:06:48.607"/>
   </p1510:revLst>
 </p1510:revInfo>
 </file>
@@ -303,7 +303,7 @@
   <pc:docChgLst>
     <pc:chgData name="KRISHNAN RAGHAVAN" userId="e78e5fe25cf75560" providerId="LiveId" clId="{665B97CF-FAC7-4FE0-A793-E43D5A8FE138}"/>
     <pc:docChg chg="undo custSel addSld delSld modSld sldOrd delSection modSection">
-      <pc:chgData name="KRISHNAN RAGHAVAN" userId="e78e5fe25cf75560" providerId="LiveId" clId="{665B97CF-FAC7-4FE0-A793-E43D5A8FE138}" dt="2024-08-21T22:34:30.217" v="3205" actId="17851"/>
+      <pc:chgData name="KRISHNAN RAGHAVAN" userId="e78e5fe25cf75560" providerId="LiveId" clId="{665B97CF-FAC7-4FE0-A793-E43D5A8FE138}" dt="2024-08-22T04:06:56.674" v="3229" actId="1076"/>
       <pc:docMkLst>
         <pc:docMk/>
       </pc:docMkLst>
@@ -546,7 +546,7 @@
         </pc:graphicFrameChg>
       </pc:sldChg>
       <pc:sldChg chg="addSp delSp modSp add mod ord">
-        <pc:chgData name="KRISHNAN RAGHAVAN" userId="e78e5fe25cf75560" providerId="LiveId" clId="{665B97CF-FAC7-4FE0-A793-E43D5A8FE138}" dt="2024-08-21T22:14:00.826" v="1841" actId="1076"/>
+        <pc:chgData name="KRISHNAN RAGHAVAN" userId="e78e5fe25cf75560" providerId="LiveId" clId="{665B97CF-FAC7-4FE0-A793-E43D5A8FE138}" dt="2024-08-22T04:06:56.674" v="3229" actId="1076"/>
         <pc:sldMkLst>
           <pc:docMk/>
           <pc:sldMk cId="3581464666" sldId="266"/>
@@ -591,22 +591,30 @@
             <ac:spMk id="7" creationId="{8BB66358-F797-1683-F060-2F12D470EA80}"/>
           </ac:spMkLst>
         </pc:spChg>
-        <pc:spChg chg="add mod">
-          <ac:chgData name="KRISHNAN RAGHAVAN" userId="e78e5fe25cf75560" providerId="LiveId" clId="{665B97CF-FAC7-4FE0-A793-E43D5A8FE138}" dt="2024-08-21T22:14:00.826" v="1841" actId="1076"/>
+        <pc:spChg chg="add del mod ord">
+          <ac:chgData name="KRISHNAN RAGHAVAN" userId="e78e5fe25cf75560" providerId="LiveId" clId="{665B97CF-FAC7-4FE0-A793-E43D5A8FE138}" dt="2024-08-22T04:01:07.520" v="3216" actId="478"/>
           <ac:spMkLst>
             <pc:docMk/>
             <pc:sldMk cId="3581464666" sldId="266"/>
             <ac:spMk id="12" creationId="{3626B5F6-D3E4-717B-438D-E186AC03D77D}"/>
           </ac:spMkLst>
         </pc:spChg>
-        <pc:spChg chg="add mod">
-          <ac:chgData name="KRISHNAN RAGHAVAN" userId="e78e5fe25cf75560" providerId="LiveId" clId="{665B97CF-FAC7-4FE0-A793-E43D5A8FE138}" dt="2024-08-21T21:57:39.140" v="976" actId="1076"/>
+        <pc:spChg chg="add del mod ord">
+          <ac:chgData name="KRISHNAN RAGHAVAN" userId="e78e5fe25cf75560" providerId="LiveId" clId="{665B97CF-FAC7-4FE0-A793-E43D5A8FE138}" dt="2024-08-22T04:01:10.576" v="3217" actId="478"/>
           <ac:spMkLst>
             <pc:docMk/>
             <pc:sldMk cId="3581464666" sldId="266"/>
             <ac:spMk id="13" creationId="{892BBBD9-9B4D-FE09-8585-D01BDEBE2C6E}"/>
           </ac:spMkLst>
         </pc:spChg>
+        <pc:picChg chg="add mod">
+          <ac:chgData name="KRISHNAN RAGHAVAN" userId="e78e5fe25cf75560" providerId="LiveId" clId="{665B97CF-FAC7-4FE0-A793-E43D5A8FE138}" dt="2024-08-22T04:01:28.714" v="3221" actId="14100"/>
+          <ac:picMkLst>
+            <pc:docMk/>
+            <pc:sldMk cId="3581464666" sldId="266"/>
+            <ac:picMk id="4" creationId="{0D1D5E18-00C7-000B-C7E0-79A34FB0FDA1}"/>
+          </ac:picMkLst>
+        </pc:picChg>
         <pc:picChg chg="add del mod">
           <ac:chgData name="KRISHNAN RAGHAVAN" userId="e78e5fe25cf75560" providerId="LiveId" clId="{665B97CF-FAC7-4FE0-A793-E43D5A8FE138}" dt="2024-08-21T21:56:09.812" v="965" actId="478"/>
           <ac:picMkLst>
@@ -615,14 +623,30 @@
             <ac:picMk id="9" creationId="{C1FD564F-0ECC-7929-6ACC-D365E66DC379}"/>
           </ac:picMkLst>
         </pc:picChg>
-        <pc:picChg chg="add mod">
-          <ac:chgData name="KRISHNAN RAGHAVAN" userId="e78e5fe25cf75560" providerId="LiveId" clId="{665B97CF-FAC7-4FE0-A793-E43D5A8FE138}" dt="2024-08-21T22:13:58.114" v="1840" actId="14100"/>
+        <pc:picChg chg="add del mod">
+          <ac:chgData name="KRISHNAN RAGHAVAN" userId="e78e5fe25cf75560" providerId="LiveId" clId="{665B97CF-FAC7-4FE0-A793-E43D5A8FE138}" dt="2024-08-22T04:00:11.987" v="3206" actId="478"/>
           <ac:picMkLst>
             <pc:docMk/>
             <pc:sldMk cId="3581464666" sldId="266"/>
             <ac:picMk id="11" creationId="{8B83BFC4-38D4-3C16-0A9A-E76CD7F79135}"/>
           </ac:picMkLst>
         </pc:picChg>
+        <pc:cxnChg chg="add mod">
+          <ac:chgData name="KRISHNAN RAGHAVAN" userId="e78e5fe25cf75560" providerId="LiveId" clId="{665B97CF-FAC7-4FE0-A793-E43D5A8FE138}" dt="2024-08-22T04:02:42.519" v="3225" actId="1076"/>
+          <ac:cxnSpMkLst>
+            <pc:docMk/>
+            <pc:sldMk cId="3581464666" sldId="266"/>
+            <ac:cxnSpMk id="6" creationId="{A2304137-71EC-F510-48F3-8BEEDCDD4F6C}"/>
+          </ac:cxnSpMkLst>
+        </pc:cxnChg>
+        <pc:cxnChg chg="add mod">
+          <ac:chgData name="KRISHNAN RAGHAVAN" userId="e78e5fe25cf75560" providerId="LiveId" clId="{665B97CF-FAC7-4FE0-A793-E43D5A8FE138}" dt="2024-08-22T04:06:56.674" v="3229" actId="1076"/>
+          <ac:cxnSpMkLst>
+            <pc:docMk/>
+            <pc:sldMk cId="3581464666" sldId="266"/>
+            <ac:cxnSpMk id="7" creationId="{A8776C97-F20A-506C-66A3-F86307835F2C}"/>
+          </ac:cxnSpMkLst>
+        </pc:cxnChg>
       </pc:sldChg>
       <pc:sldChg chg="addSp delSp modSp add mod ord">
         <pc:chgData name="KRISHNAN RAGHAVAN" userId="e78e5fe25cf75560" providerId="LiveId" clId="{665B97CF-FAC7-4FE0-A793-E43D5A8FE138}" dt="2024-08-21T22:15:55.710" v="2064" actId="20577"/>
@@ -7631,10 +7655,10 @@
       </p:sp>
       <p:pic>
         <p:nvPicPr>
-          <p:cNvPr id="11" name="Picture 10">
+          <p:cNvPr id="4" name="Picture 3">
             <a:extLst>
               <a:ext uri="{FF2B5EF4-FFF2-40B4-BE49-F238E27FC236}">
-                <a16:creationId xmlns:a16="http://schemas.microsoft.com/office/drawing/2014/main" id="{8B83BFC4-38D4-3C16-0A9A-E76CD7F79135}"/>
+                <a16:creationId xmlns:a16="http://schemas.microsoft.com/office/drawing/2014/main" id="{0D1D5E18-00C7-000B-C7E0-79A34FB0FDA1}"/>
               </a:ext>
             </a:extLst>
           </p:cNvPr>
@@ -7651,112 +7675,106 @@
         </p:blipFill>
         <p:spPr>
           <a:xfrm>
-            <a:off x="0" y="1062182"/>
-            <a:ext cx="9144000" cy="5795818"/>
+            <a:off x="101601" y="586101"/>
+            <a:ext cx="8867454" cy="6271900"/>
           </a:xfrm>
           <a:prstGeom prst="rect">
             <a:avLst/>
           </a:prstGeom>
         </p:spPr>
       </p:pic>
-      <p:sp>
-        <p:nvSpPr>
-          <p:cNvPr id="12" name="Arrow: Right 11">
+      <p:cxnSp>
+        <p:nvCxnSpPr>
+          <p:cNvPr id="6" name="Straight Connector 5">
             <a:extLst>
               <a:ext uri="{FF2B5EF4-FFF2-40B4-BE49-F238E27FC236}">
-                <a16:creationId xmlns:a16="http://schemas.microsoft.com/office/drawing/2014/main" id="{3626B5F6-D3E4-717B-438D-E186AC03D77D}"/>
+                <a16:creationId xmlns:a16="http://schemas.microsoft.com/office/drawing/2014/main" id="{A2304137-71EC-F510-48F3-8BEEDCDD4F6C}"/>
               </a:ext>
             </a:extLst>
           </p:cNvPr>
-          <p:cNvSpPr/>
+          <p:cNvCxnSpPr/>
           <p:nvPr/>
-        </p:nvSpPr>
+        </p:nvCxnSpPr>
         <p:spPr>
           <a:xfrm>
-            <a:off x="-163475" y="1754769"/>
-            <a:ext cx="329184" cy="174823"/>
+            <a:off x="2964873" y="5098473"/>
+            <a:ext cx="5856400" cy="0"/>
           </a:xfrm>
-          <a:prstGeom prst="rightArrow">
+          <a:prstGeom prst="line">
             <a:avLst/>
           </a:prstGeom>
-          <a:solidFill>
-            <a:srgbClr val="FF0000"/>
-          </a:solidFill>
+          <a:ln w="19050" cap="flat" cmpd="sng" algn="ctr">
+            <a:solidFill>
+              <a:srgbClr val="FF0000"/>
+            </a:solidFill>
+            <a:prstDash val="solid"/>
+            <a:round/>
+            <a:headEnd type="arrow" w="med" len="med"/>
+            <a:tailEnd type="arrow" w="med" len="med"/>
+          </a:ln>
         </p:spPr>
         <p:style>
-          <a:lnRef idx="2">
-            <a:schemeClr val="accent1">
-              <a:shade val="15000"/>
-            </a:schemeClr>
+          <a:lnRef idx="0">
+            <a:scrgbClr r="0" g="0" b="0"/>
           </a:lnRef>
-          <a:fillRef idx="1">
-            <a:schemeClr val="accent1"/>
+          <a:fillRef idx="0">
+            <a:scrgbClr r="0" g="0" b="0"/>
           </a:fillRef>
           <a:effectRef idx="0">
-            <a:schemeClr val="accent1"/>
+            <a:scrgbClr r="0" g="0" b="0"/>
           </a:effectRef>
           <a:fontRef idx="minor">
-            <a:schemeClr val="lt1"/>
+            <a:schemeClr val="tx1"/>
           </a:fontRef>
         </p:style>
-        <p:txBody>
-          <a:bodyPr rtlCol="0" anchor="ctr"/>
-          <a:lstStyle/>
-          <a:p>
-            <a:pPr algn="ctr"/>
-            <a:endParaRPr lang="en-US"/>
-          </a:p>
-        </p:txBody>
-      </p:sp>
-      <p:sp>
-        <p:nvSpPr>
-          <p:cNvPr id="13" name="Arrow: Right 12">
+      </p:cxnSp>
+      <p:cxnSp>
+        <p:nvCxnSpPr>
+          <p:cNvPr id="7" name="Straight Connector 6">
             <a:extLst>
               <a:ext uri="{FF2B5EF4-FFF2-40B4-BE49-F238E27FC236}">
-                <a16:creationId xmlns:a16="http://schemas.microsoft.com/office/drawing/2014/main" id="{892BBBD9-9B4D-FE09-8585-D01BDEBE2C6E}"/>
+                <a16:creationId xmlns:a16="http://schemas.microsoft.com/office/drawing/2014/main" id="{A8776C97-F20A-506C-66A3-F86307835F2C}"/>
               </a:ext>
             </a:extLst>
           </p:cNvPr>
-          <p:cNvSpPr/>
+          <p:cNvCxnSpPr>
+            <a:cxnSpLocks/>
+          </p:cNvCxnSpPr>
           <p:nvPr/>
-        </p:nvSpPr>
+        </p:nvCxnSpPr>
         <p:spPr>
           <a:xfrm>
-            <a:off x="-235332" y="5846017"/>
-            <a:ext cx="329184" cy="174823"/>
+            <a:off x="101601" y="6858000"/>
+            <a:ext cx="2743199" cy="0"/>
           </a:xfrm>
-          <a:prstGeom prst="rightArrow">
+          <a:prstGeom prst="line">
             <a:avLst/>
           </a:prstGeom>
-          <a:solidFill>
-            <a:srgbClr val="FF0000"/>
-          </a:solidFill>
+          <a:ln w="19050" cap="flat" cmpd="sng" algn="ctr">
+            <a:solidFill>
+              <a:srgbClr val="FF0000"/>
+            </a:solidFill>
+            <a:prstDash val="solid"/>
+            <a:round/>
+            <a:headEnd type="arrow" w="med" len="med"/>
+            <a:tailEnd type="arrow" w="med" len="med"/>
+          </a:ln>
         </p:spPr>
         <p:style>
-          <a:lnRef idx="2">
-            <a:schemeClr val="accent1">
-              <a:shade val="15000"/>
-            </a:schemeClr>
+          <a:lnRef idx="0">
+            <a:scrgbClr r="0" g="0" b="0"/>
           </a:lnRef>
-          <a:fillRef idx="1">
-            <a:schemeClr val="accent1"/>
+          <a:fillRef idx="0">
+            <a:scrgbClr r="0" g="0" b="0"/>
           </a:fillRef>
           <a:effectRef idx="0">
-            <a:schemeClr val="accent1"/>
+            <a:scrgbClr r="0" g="0" b="0"/>
           </a:effectRef>
           <a:fontRef idx="minor">
-            <a:schemeClr val="lt1"/>
+            <a:schemeClr val="tx1"/>
           </a:fontRef>
         </p:style>
-        <p:txBody>
-          <a:bodyPr rtlCol="0" anchor="ctr"/>
-          <a:lstStyle/>
-          <a:p>
-            <a:pPr algn="ctr"/>
-            <a:endParaRPr lang="en-US"/>
-          </a:p>
-        </p:txBody>
-      </p:sp>
+      </p:cxnSp>
     </p:spTree>
     <p:extLst>
       <p:ext uri="{BB962C8B-B14F-4D97-AF65-F5344CB8AC3E}">

</xml_diff>